<commit_message>
upload first part of ppt
</commit_message>
<xml_diff>
--- a/self-study resources/J8SE1/Chapter 4 - Methods and Encapsulation.pptx
+++ b/self-study resources/J8SE1/Chapter 4 - Methods and Encapsulation.pptx
@@ -1051,7 +1051,7 @@
           </a:lstStyle>
           <a:p>
             <a:fld id="{9ACA2D73-2532-A640-A667-27AB4D0D333F}" type="datetimeFigureOut">
-              <a:t>22/11/24</a:t>
+              <a:t>23/11/24</a:t>
             </a:fld>
             <a:endParaRPr lang="en-VN"/>
           </a:p>
@@ -2628,7 +2628,7 @@
           <a:p>
             <a:fld id="{BAA8DE05-51EE-4692-B197-877FA1DAAAED}" type="datetimeFigureOut">
               <a:rPr lang="en-US" smtClean="0"/>
-              <a:t>11/22/24</a:t>
+              <a:t>11/23/24</a:t>
             </a:fld>
             <a:endParaRPr lang="en-US"/>
           </a:p>
@@ -2826,7 +2826,7 @@
           <a:p>
             <a:fld id="{BAA8DE05-51EE-4692-B197-877FA1DAAAED}" type="datetimeFigureOut">
               <a:rPr lang="en-US" smtClean="0"/>
-              <a:t>11/22/24</a:t>
+              <a:t>11/23/24</a:t>
             </a:fld>
             <a:endParaRPr lang="en-US"/>
           </a:p>
@@ -3034,7 +3034,7 @@
           <a:p>
             <a:fld id="{BAA8DE05-51EE-4692-B197-877FA1DAAAED}" type="datetimeFigureOut">
               <a:rPr lang="en-US" smtClean="0"/>
-              <a:t>11/22/24</a:t>
+              <a:t>11/23/24</a:t>
             </a:fld>
             <a:endParaRPr lang="en-US"/>
           </a:p>
@@ -3232,7 +3232,7 @@
           <a:p>
             <a:fld id="{BAA8DE05-51EE-4692-B197-877FA1DAAAED}" type="datetimeFigureOut">
               <a:rPr lang="en-US" smtClean="0"/>
-              <a:t>11/22/24</a:t>
+              <a:t>11/23/24</a:t>
             </a:fld>
             <a:endParaRPr lang="en-US"/>
           </a:p>
@@ -3507,7 +3507,7 @@
           <a:p>
             <a:fld id="{BAA8DE05-51EE-4692-B197-877FA1DAAAED}" type="datetimeFigureOut">
               <a:rPr lang="en-US" smtClean="0"/>
-              <a:t>11/22/24</a:t>
+              <a:t>11/23/24</a:t>
             </a:fld>
             <a:endParaRPr lang="en-US"/>
           </a:p>
@@ -3772,7 +3772,7 @@
           <a:p>
             <a:fld id="{BAA8DE05-51EE-4692-B197-877FA1DAAAED}" type="datetimeFigureOut">
               <a:rPr lang="en-US" smtClean="0"/>
-              <a:t>11/22/24</a:t>
+              <a:t>11/23/24</a:t>
             </a:fld>
             <a:endParaRPr lang="en-US"/>
           </a:p>
@@ -4184,7 +4184,7 @@
           <a:p>
             <a:fld id="{BAA8DE05-51EE-4692-B197-877FA1DAAAED}" type="datetimeFigureOut">
               <a:rPr lang="en-US" smtClean="0"/>
-              <a:t>11/22/24</a:t>
+              <a:t>11/23/24</a:t>
             </a:fld>
             <a:endParaRPr lang="en-US"/>
           </a:p>
@@ -4325,7 +4325,7 @@
           <a:p>
             <a:fld id="{BAA8DE05-51EE-4692-B197-877FA1DAAAED}" type="datetimeFigureOut">
               <a:rPr lang="en-US" smtClean="0"/>
-              <a:t>11/22/24</a:t>
+              <a:t>11/23/24</a:t>
             </a:fld>
             <a:endParaRPr lang="en-US"/>
           </a:p>
@@ -4438,7 +4438,7 @@
           <a:p>
             <a:fld id="{BAA8DE05-51EE-4692-B197-877FA1DAAAED}" type="datetimeFigureOut">
               <a:rPr lang="en-US" smtClean="0"/>
-              <a:t>11/22/24</a:t>
+              <a:t>11/23/24</a:t>
             </a:fld>
             <a:endParaRPr lang="en-US"/>
           </a:p>
@@ -4749,7 +4749,7 @@
           <a:p>
             <a:fld id="{BAA8DE05-51EE-4692-B197-877FA1DAAAED}" type="datetimeFigureOut">
               <a:rPr lang="en-US" smtClean="0"/>
-              <a:t>11/22/24</a:t>
+              <a:t>11/23/24</a:t>
             </a:fld>
             <a:endParaRPr lang="en-US"/>
           </a:p>
@@ -5037,7 +5037,7 @@
           <a:p>
             <a:fld id="{BAA8DE05-51EE-4692-B197-877FA1DAAAED}" type="datetimeFigureOut">
               <a:rPr lang="en-US" smtClean="0"/>
-              <a:t>11/22/24</a:t>
+              <a:t>11/23/24</a:t>
             </a:fld>
             <a:endParaRPr lang="en-US"/>
           </a:p>
@@ -5278,7 +5278,7 @@
           <a:p>
             <a:fld id="{BAA8DE05-51EE-4692-B197-877FA1DAAAED}" type="datetimeFigureOut">
               <a:rPr lang="en-US" smtClean="0"/>
-              <a:t>11/22/24</a:t>
+              <a:t>11/23/24</a:t>
             </a:fld>
             <a:endParaRPr lang="en-US"/>
           </a:p>
@@ -6130,8 +6130,8 @@
           </a:prstGeom>
         </p:spPr>
       </p:pic>
-      <mc:AlternateContent xmlns:mc="http://schemas.openxmlformats.org/markup-compatibility/2006">
-        <mc:Choice xmlns:p14="http://schemas.microsoft.com/office/powerpoint/2010/main" Requires="p14">
+      <mc:AlternateContent xmlns:mc="http://schemas.openxmlformats.org/markup-compatibility/2006" xmlns:p14="http://schemas.microsoft.com/office/powerpoint/2010/main">
+        <mc:Choice Requires="p14">
           <p:contentPart p14:bwMode="auto" r:id="rId4">
             <p14:nvContentPartPr>
               <p14:cNvPr id="6" name="Ink 5">
@@ -6150,7 +6150,7 @@
             </p14:xfrm>
           </p:contentPart>
         </mc:Choice>
-        <mc:Fallback>
+        <mc:Fallback xmlns="">
           <p:pic>
             <p:nvPicPr>
               <p:cNvPr id="6" name="Ink 5">
@@ -9101,8 +9101,8 @@
             <a:chExt cx="485640" cy="48600"/>
           </a:xfrm>
         </p:grpSpPr>
-        <mc:AlternateContent xmlns:mc="http://schemas.openxmlformats.org/markup-compatibility/2006">
-          <mc:Choice xmlns:p14="http://schemas.microsoft.com/office/powerpoint/2010/main" Requires="p14">
+        <mc:AlternateContent xmlns:mc="http://schemas.openxmlformats.org/markup-compatibility/2006" xmlns:p14="http://schemas.microsoft.com/office/powerpoint/2010/main">
+          <mc:Choice Requires="p14">
             <p:contentPart p14:bwMode="auto" r:id="rId4">
               <p14:nvContentPartPr>
                 <p14:cNvPr id="5" name="Ink 4">
@@ -9121,7 +9121,7 @@
               </p14:xfrm>
             </p:contentPart>
           </mc:Choice>
-          <mc:Fallback>
+          <mc:Fallback xmlns="">
             <p:pic>
               <p:nvPicPr>
                 <p:cNvPr id="5" name="Ink 4">
@@ -9152,8 +9152,8 @@
             </p:pic>
           </mc:Fallback>
         </mc:AlternateContent>
-        <mc:AlternateContent xmlns:mc="http://schemas.openxmlformats.org/markup-compatibility/2006">
-          <mc:Choice xmlns:p14="http://schemas.microsoft.com/office/powerpoint/2010/main" Requires="p14">
+        <mc:AlternateContent xmlns:mc="http://schemas.openxmlformats.org/markup-compatibility/2006" xmlns:p14="http://schemas.microsoft.com/office/powerpoint/2010/main">
+          <mc:Choice Requires="p14">
             <p:contentPart p14:bwMode="auto" r:id="rId6">
               <p14:nvContentPartPr>
                 <p14:cNvPr id="6" name="Ink 5">
@@ -9172,7 +9172,7 @@
               </p14:xfrm>
             </p:contentPart>
           </mc:Choice>
-          <mc:Fallback>
+          <mc:Fallback xmlns="">
             <p:pic>
               <p:nvPicPr>
                 <p:cNvPr id="6" name="Ink 5">
@@ -9204,8 +9204,8 @@
           </mc:Fallback>
         </mc:AlternateContent>
       </p:grpSp>
-      <mc:AlternateContent xmlns:mc="http://schemas.openxmlformats.org/markup-compatibility/2006">
-        <mc:Choice xmlns:p14="http://schemas.microsoft.com/office/powerpoint/2010/main" Requires="p14">
+      <mc:AlternateContent xmlns:mc="http://schemas.openxmlformats.org/markup-compatibility/2006" xmlns:p14="http://schemas.microsoft.com/office/powerpoint/2010/main">
+        <mc:Choice Requires="p14">
           <p:contentPart p14:bwMode="auto" r:id="rId8">
             <p14:nvContentPartPr>
               <p14:cNvPr id="7" name="Ink 6">
@@ -9224,7 +9224,7 @@
             </p14:xfrm>
           </p:contentPart>
         </mc:Choice>
-        <mc:Fallback>
+        <mc:Fallback xmlns="">
           <p:pic>
             <p:nvPicPr>
               <p:cNvPr id="7" name="Ink 6">
@@ -9255,8 +9255,8 @@
           </p:pic>
         </mc:Fallback>
       </mc:AlternateContent>
-      <mc:AlternateContent xmlns:mc="http://schemas.openxmlformats.org/markup-compatibility/2006">
-        <mc:Choice xmlns:p14="http://schemas.microsoft.com/office/powerpoint/2010/main" Requires="p14">
+      <mc:AlternateContent xmlns:mc="http://schemas.openxmlformats.org/markup-compatibility/2006" xmlns:p14="http://schemas.microsoft.com/office/powerpoint/2010/main">
+        <mc:Choice Requires="p14">
           <p:contentPart p14:bwMode="auto" r:id="rId10">
             <p14:nvContentPartPr>
               <p14:cNvPr id="10" name="Ink 9">
@@ -9275,7 +9275,7 @@
             </p14:xfrm>
           </p:contentPart>
         </mc:Choice>
-        <mc:Fallback>
+        <mc:Fallback xmlns="">
           <p:pic>
             <p:nvPicPr>
               <p:cNvPr id="10" name="Ink 9">
@@ -9306,8 +9306,8 @@
           </p:pic>
         </mc:Fallback>
       </mc:AlternateContent>
-      <mc:AlternateContent xmlns:mc="http://schemas.openxmlformats.org/markup-compatibility/2006">
-        <mc:Choice xmlns:p14="http://schemas.microsoft.com/office/powerpoint/2010/main" Requires="p14">
+      <mc:AlternateContent xmlns:mc="http://schemas.openxmlformats.org/markup-compatibility/2006" xmlns:p14="http://schemas.microsoft.com/office/powerpoint/2010/main">
+        <mc:Choice Requires="p14">
           <p:contentPart p14:bwMode="auto" r:id="rId12">
             <p14:nvContentPartPr>
               <p14:cNvPr id="11" name="Ink 10">
@@ -9326,7 +9326,7 @@
             </p14:xfrm>
           </p:contentPart>
         </mc:Choice>
-        <mc:Fallback>
+        <mc:Fallback xmlns="">
           <p:pic>
             <p:nvPicPr>
               <p:cNvPr id="11" name="Ink 10">
@@ -9357,8 +9357,8 @@
           </p:pic>
         </mc:Fallback>
       </mc:AlternateContent>
-      <mc:AlternateContent xmlns:mc="http://schemas.openxmlformats.org/markup-compatibility/2006">
-        <mc:Choice xmlns:p14="http://schemas.microsoft.com/office/powerpoint/2010/main" Requires="p14">
+      <mc:AlternateContent xmlns:mc="http://schemas.openxmlformats.org/markup-compatibility/2006" xmlns:p14="http://schemas.microsoft.com/office/powerpoint/2010/main">
+        <mc:Choice Requires="p14">
           <p:contentPart p14:bwMode="auto" r:id="rId14">
             <p14:nvContentPartPr>
               <p14:cNvPr id="12" name="Ink 11">
@@ -9377,7 +9377,7 @@
             </p14:xfrm>
           </p:contentPart>
         </mc:Choice>
-        <mc:Fallback>
+        <mc:Fallback xmlns="">
           <p:pic>
             <p:nvPicPr>
               <p:cNvPr id="12" name="Ink 11">
@@ -9408,8 +9408,8 @@
           </p:pic>
         </mc:Fallback>
       </mc:AlternateContent>
-      <mc:AlternateContent xmlns:mc="http://schemas.openxmlformats.org/markup-compatibility/2006">
-        <mc:Choice xmlns:p14="http://schemas.microsoft.com/office/powerpoint/2010/main" Requires="p14">
+      <mc:AlternateContent xmlns:mc="http://schemas.openxmlformats.org/markup-compatibility/2006" xmlns:p14="http://schemas.microsoft.com/office/powerpoint/2010/main">
+        <mc:Choice Requires="p14">
           <p:contentPart p14:bwMode="auto" r:id="rId16">
             <p14:nvContentPartPr>
               <p14:cNvPr id="13" name="Ink 12">
@@ -9428,7 +9428,7 @@
             </p14:xfrm>
           </p:contentPart>
         </mc:Choice>
-        <mc:Fallback>
+        <mc:Fallback xmlns="">
           <p:pic>
             <p:nvPicPr>
               <p:cNvPr id="13" name="Ink 12">
@@ -9459,8 +9459,8 @@
           </p:pic>
         </mc:Fallback>
       </mc:AlternateContent>
-      <mc:AlternateContent xmlns:mc="http://schemas.openxmlformats.org/markup-compatibility/2006">
-        <mc:Choice xmlns:p14="http://schemas.microsoft.com/office/powerpoint/2010/main" Requires="p14">
+      <mc:AlternateContent xmlns:mc="http://schemas.openxmlformats.org/markup-compatibility/2006" xmlns:p14="http://schemas.microsoft.com/office/powerpoint/2010/main">
+        <mc:Choice Requires="p14">
           <p:contentPart p14:bwMode="auto" r:id="rId18">
             <p14:nvContentPartPr>
               <p14:cNvPr id="14" name="Ink 13">
@@ -9479,7 +9479,7 @@
             </p14:xfrm>
           </p:contentPart>
         </mc:Choice>
-        <mc:Fallback>
+        <mc:Fallback xmlns="">
           <p:pic>
             <p:nvPicPr>
               <p:cNvPr id="14" name="Ink 13">
@@ -9510,8 +9510,8 @@
           </p:pic>
         </mc:Fallback>
       </mc:AlternateContent>
-      <mc:AlternateContent xmlns:mc="http://schemas.openxmlformats.org/markup-compatibility/2006">
-        <mc:Choice xmlns:p14="http://schemas.microsoft.com/office/powerpoint/2010/main" Requires="p14">
+      <mc:AlternateContent xmlns:mc="http://schemas.openxmlformats.org/markup-compatibility/2006" xmlns:p14="http://schemas.microsoft.com/office/powerpoint/2010/main">
+        <mc:Choice Requires="p14">
           <p:contentPart p14:bwMode="auto" r:id="rId20">
             <p14:nvContentPartPr>
               <p14:cNvPr id="15" name="Ink 14">
@@ -9530,7 +9530,7 @@
             </p14:xfrm>
           </p:contentPart>
         </mc:Choice>
-        <mc:Fallback>
+        <mc:Fallback xmlns="">
           <p:pic>
             <p:nvPicPr>
               <p:cNvPr id="15" name="Ink 14">
@@ -9561,8 +9561,8 @@
           </p:pic>
         </mc:Fallback>
       </mc:AlternateContent>
-      <mc:AlternateContent xmlns:mc="http://schemas.openxmlformats.org/markup-compatibility/2006">
-        <mc:Choice xmlns:p14="http://schemas.microsoft.com/office/powerpoint/2010/main" Requires="p14">
+      <mc:AlternateContent xmlns:mc="http://schemas.openxmlformats.org/markup-compatibility/2006" xmlns:p14="http://schemas.microsoft.com/office/powerpoint/2010/main">
+        <mc:Choice Requires="p14">
           <p:contentPart p14:bwMode="auto" r:id="rId22">
             <p14:nvContentPartPr>
               <p14:cNvPr id="16" name="Ink 15">
@@ -9581,7 +9581,7 @@
             </p14:xfrm>
           </p:contentPart>
         </mc:Choice>
-        <mc:Fallback>
+        <mc:Fallback xmlns="">
           <p:pic>
             <p:nvPicPr>
               <p:cNvPr id="16" name="Ink 15">
@@ -9612,8 +9612,8 @@
           </p:pic>
         </mc:Fallback>
       </mc:AlternateContent>
-      <mc:AlternateContent xmlns:mc="http://schemas.openxmlformats.org/markup-compatibility/2006">
-        <mc:Choice xmlns:p14="http://schemas.microsoft.com/office/powerpoint/2010/main" Requires="p14">
+      <mc:AlternateContent xmlns:mc="http://schemas.openxmlformats.org/markup-compatibility/2006" xmlns:p14="http://schemas.microsoft.com/office/powerpoint/2010/main">
+        <mc:Choice Requires="p14">
           <p:contentPart p14:bwMode="auto" r:id="rId24">
             <p14:nvContentPartPr>
               <p14:cNvPr id="17" name="Ink 16">
@@ -9632,7 +9632,7 @@
             </p14:xfrm>
           </p:contentPart>
         </mc:Choice>
-        <mc:Fallback>
+        <mc:Fallback xmlns="">
           <p:pic>
             <p:nvPicPr>
               <p:cNvPr id="17" name="Ink 16">
@@ -9663,8 +9663,8 @@
           </p:pic>
         </mc:Fallback>
       </mc:AlternateContent>
-      <mc:AlternateContent xmlns:mc="http://schemas.openxmlformats.org/markup-compatibility/2006">
-        <mc:Choice xmlns:p14="http://schemas.microsoft.com/office/powerpoint/2010/main" Requires="p14">
+      <mc:AlternateContent xmlns:mc="http://schemas.openxmlformats.org/markup-compatibility/2006" xmlns:p14="http://schemas.microsoft.com/office/powerpoint/2010/main">
+        <mc:Choice Requires="p14">
           <p:contentPart p14:bwMode="auto" r:id="rId26">
             <p14:nvContentPartPr>
               <p14:cNvPr id="18" name="Ink 17">
@@ -9683,7 +9683,7 @@
             </p14:xfrm>
           </p:contentPart>
         </mc:Choice>
-        <mc:Fallback>
+        <mc:Fallback xmlns="">
           <p:pic>
             <p:nvPicPr>
               <p:cNvPr id="18" name="Ink 17">
@@ -9714,8 +9714,8 @@
           </p:pic>
         </mc:Fallback>
       </mc:AlternateContent>
-      <mc:AlternateContent xmlns:mc="http://schemas.openxmlformats.org/markup-compatibility/2006">
-        <mc:Choice xmlns:p14="http://schemas.microsoft.com/office/powerpoint/2010/main" Requires="p14">
+      <mc:AlternateContent xmlns:mc="http://schemas.openxmlformats.org/markup-compatibility/2006" xmlns:p14="http://schemas.microsoft.com/office/powerpoint/2010/main">
+        <mc:Choice Requires="p14">
           <p:contentPart p14:bwMode="auto" r:id="rId28">
             <p14:nvContentPartPr>
               <p14:cNvPr id="19" name="Ink 18">
@@ -9734,7 +9734,7 @@
             </p14:xfrm>
           </p:contentPart>
         </mc:Choice>
-        <mc:Fallback>
+        <mc:Fallback xmlns="">
           <p:pic>
             <p:nvPicPr>
               <p:cNvPr id="19" name="Ink 18">
@@ -9765,8 +9765,8 @@
           </p:pic>
         </mc:Fallback>
       </mc:AlternateContent>
-      <mc:AlternateContent xmlns:mc="http://schemas.openxmlformats.org/markup-compatibility/2006">
-        <mc:Choice xmlns:p14="http://schemas.microsoft.com/office/powerpoint/2010/main" Requires="p14">
+      <mc:AlternateContent xmlns:mc="http://schemas.openxmlformats.org/markup-compatibility/2006" xmlns:p14="http://schemas.microsoft.com/office/powerpoint/2010/main">
+        <mc:Choice Requires="p14">
           <p:contentPart p14:bwMode="auto" r:id="rId30">
             <p14:nvContentPartPr>
               <p14:cNvPr id="20" name="Ink 19">
@@ -9785,7 +9785,7 @@
             </p14:xfrm>
           </p:contentPart>
         </mc:Choice>
-        <mc:Fallback>
+        <mc:Fallback xmlns="">
           <p:pic>
             <p:nvPicPr>
               <p:cNvPr id="20" name="Ink 19">
@@ -9816,8 +9816,8 @@
           </p:pic>
         </mc:Fallback>
       </mc:AlternateContent>
-      <mc:AlternateContent xmlns:mc="http://schemas.openxmlformats.org/markup-compatibility/2006">
-        <mc:Choice xmlns:p14="http://schemas.microsoft.com/office/powerpoint/2010/main" Requires="p14">
+      <mc:AlternateContent xmlns:mc="http://schemas.openxmlformats.org/markup-compatibility/2006" xmlns:p14="http://schemas.microsoft.com/office/powerpoint/2010/main">
+        <mc:Choice Requires="p14">
           <p:contentPart p14:bwMode="auto" r:id="rId32">
             <p14:nvContentPartPr>
               <p14:cNvPr id="21" name="Ink 20">
@@ -9836,7 +9836,7 @@
             </p14:xfrm>
           </p:contentPart>
         </mc:Choice>
-        <mc:Fallback>
+        <mc:Fallback xmlns="">
           <p:pic>
             <p:nvPicPr>
               <p:cNvPr id="21" name="Ink 20">
@@ -9867,8 +9867,8 @@
           </p:pic>
         </mc:Fallback>
       </mc:AlternateContent>
-      <mc:AlternateContent xmlns:mc="http://schemas.openxmlformats.org/markup-compatibility/2006">
-        <mc:Choice xmlns:p14="http://schemas.microsoft.com/office/powerpoint/2010/main" Requires="p14">
+      <mc:AlternateContent xmlns:mc="http://schemas.openxmlformats.org/markup-compatibility/2006" xmlns:p14="http://schemas.microsoft.com/office/powerpoint/2010/main">
+        <mc:Choice Requires="p14">
           <p:contentPart p14:bwMode="auto" r:id="rId34">
             <p14:nvContentPartPr>
               <p14:cNvPr id="22" name="Ink 21">
@@ -9887,7 +9887,7 @@
             </p14:xfrm>
           </p:contentPart>
         </mc:Choice>
-        <mc:Fallback>
+        <mc:Fallback xmlns="">
           <p:pic>
             <p:nvPicPr>
               <p:cNvPr id="22" name="Ink 21">
@@ -9918,8 +9918,8 @@
           </p:pic>
         </mc:Fallback>
       </mc:AlternateContent>
-      <mc:AlternateContent xmlns:mc="http://schemas.openxmlformats.org/markup-compatibility/2006">
-        <mc:Choice xmlns:p14="http://schemas.microsoft.com/office/powerpoint/2010/main" Requires="p14">
+      <mc:AlternateContent xmlns:mc="http://schemas.openxmlformats.org/markup-compatibility/2006" xmlns:p14="http://schemas.microsoft.com/office/powerpoint/2010/main">
+        <mc:Choice Requires="p14">
           <p:contentPart p14:bwMode="auto" r:id="rId36">
             <p14:nvContentPartPr>
               <p14:cNvPr id="23" name="Ink 22">
@@ -9938,7 +9938,7 @@
             </p14:xfrm>
           </p:contentPart>
         </mc:Choice>
-        <mc:Fallback>
+        <mc:Fallback xmlns="">
           <p:pic>
             <p:nvPicPr>
               <p:cNvPr id="23" name="Ink 22">

</xml_diff>